<commit_message>
Generazione automatica dell'elenco delle slide nella slide "index" la 2
</commit_message>
<xml_diff>
--- a/Solution/FilesEditor.Tests/TestFiles/SourceFiles/PowerPoint_Template.pptx
+++ b/Solution/FilesEditor.Tests/TestFiles/SourceFiles/PowerPoint_Template.pptx
@@ -21,7 +21,7 @@
   </p:handoutMasterIdLst>
   <p:sldIdLst>
     <p:sldId id="344" r:id="rId11"/>
-    <p:sldId id="342" r:id="rId12"/>
+    <p:sldId id="345" r:id="rId12"/>
     <p:sldId id="343" r:id="rId13"/>
   </p:sldIdLst>
   <p:sldSz cx="10688638" cy="6016625"/>
@@ -241,7 +241,7 @@
             <a:fld id="{73BD9947-774B-094C-86BB-7C1BB671F378}" type="datetime1">
               <a:rPr lang="it-IT"/>
               <a:pPr/>
-              <a:t>01/10/2025</a:t>
+              <a:t>18/10/2025</a:t>
             </a:fld>
             <a:endParaRPr lang="it-IT"/>
           </a:p>
@@ -409,7 +409,7 @@
             <a:fld id="{686F962A-24C2-CB42-9306-9FB7F7CEB1DA}" type="datetime1">
               <a:rPr lang="it-IT"/>
               <a:pPr/>
-              <a:t>01/10/2025</a:t>
+              <a:t>18/10/2025</a:t>
             </a:fld>
             <a:endParaRPr lang="it-IT"/>
           </a:p>
@@ -773,7 +773,7 @@
             <a:fld id="{8214DEE6-7743-F44A-92DF-ABEA6EBF579C}" type="datetime1">
               <a:rPr lang="it-IT"/>
               <a:pPr/>
-              <a:t>01/10/2025</a:t>
+              <a:t>18/10/2025</a:t>
             </a:fld>
             <a:endParaRPr lang="it-IT"/>
           </a:p>
@@ -1449,7 +1449,7 @@
             <a:fld id="{B9C6BC69-A223-7D4A-AE22-15BEED04061C}" type="datetime1">
               <a:rPr lang="it-IT"/>
               <a:pPr/>
-              <a:t>01/10/2025</a:t>
+              <a:t>18/10/2025</a:t>
             </a:fld>
             <a:endParaRPr lang="it-IT"/>
           </a:p>
@@ -2041,7 +2041,7 @@
             <a:fld id="{B9C6BC69-A223-7D4A-AE22-15BEED04061C}" type="datetime1">
               <a:rPr lang="it-IT"/>
               <a:pPr/>
-              <a:t>01/10/2025</a:t>
+              <a:t>18/10/2025</a:t>
             </a:fld>
             <a:endParaRPr lang="it-IT"/>
           </a:p>
@@ -2801,7 +2801,7 @@
             <a:fld id="{B9C6BC69-A223-7D4A-AE22-15BEED04061C}" type="datetime1">
               <a:rPr lang="it-IT"/>
               <a:pPr/>
-              <a:t>01/10/2025</a:t>
+              <a:t>18/10/2025</a:t>
             </a:fld>
             <a:endParaRPr lang="it-IT"/>
           </a:p>
@@ -4088,7 +4088,7 @@
             <a:fld id="{B9C6BC69-A223-7D4A-AE22-15BEED04061C}" type="datetime1">
               <a:rPr lang="it-IT"/>
               <a:pPr/>
-              <a:t>01/10/2025</a:t>
+              <a:t>18/10/2025</a:t>
             </a:fld>
             <a:endParaRPr lang="it-IT"/>
           </a:p>
@@ -4541,7 +4541,7 @@
             <a:fld id="{B9C6BC69-A223-7D4A-AE22-15BEED04061C}" type="datetime1">
               <a:rPr lang="it-IT"/>
               <a:pPr/>
-              <a:t>01/10/2025</a:t>
+              <a:t>18/10/2025</a:t>
             </a:fld>
             <a:endParaRPr lang="it-IT"/>
           </a:p>
@@ -4736,7 +4736,7 @@
             <a:fld id="{B9C6BC69-A223-7D4A-AE22-15BEED04061C}" type="datetime1">
               <a:rPr lang="it-IT"/>
               <a:pPr/>
-              <a:t>01/10/2025</a:t>
+              <a:t>18/10/2025</a:t>
             </a:fld>
             <a:endParaRPr lang="it-IT"/>
           </a:p>
@@ -4797,7 +4797,7 @@
           <a:graphicData uri="http://schemas.openxmlformats.org/presentationml/2006/ole">
             <mc:AlternateContent xmlns:mc="http://schemas.openxmlformats.org/markup-compatibility/2006">
               <mc:Choice xmlns:v="urn:schemas-microsoft-com:vml" Requires="v">
-                <p:oleObj spid="_x0000_s5131" name="Diapositiva think-cell" r:id="rId4" imgW="270" imgH="270" progId="TCLayout.ActiveDocument.1">
+                <p:oleObj spid="_x0000_s5135" name="Diapositiva think-cell" r:id="rId4" imgW="270" imgH="270" progId="TCLayout.ActiveDocument.1">
                   <p:embed/>
                 </p:oleObj>
               </mc:Choice>
@@ -4914,7 +4914,7 @@
             <a:fld id="{B9C6BC69-A223-7D4A-AE22-15BEED04061C}" type="datetime1">
               <a:rPr lang="it-IT" smtClean="0"/>
               <a:pPr/>
-              <a:t>01/10/2025</a:t>
+              <a:t>18/10/2025</a:t>
             </a:fld>
             <a:endParaRPr lang="it-IT" dirty="0"/>
           </a:p>
@@ -7262,7 +7262,7 @@
             <a:fld id="{B9C6BC69-A223-7D4A-AE22-15BEED04061C}" type="datetime1">
               <a:rPr lang="it-IT"/>
               <a:pPr/>
-              <a:t>01/10/2025</a:t>
+              <a:t>18/10/2025</a:t>
             </a:fld>
             <a:endParaRPr lang="it-IT"/>
           </a:p>
@@ -7323,7 +7323,7 @@
           <a:graphicData uri="http://schemas.openxmlformats.org/presentationml/2006/ole">
             <mc:AlternateContent xmlns:mc="http://schemas.openxmlformats.org/markup-compatibility/2006">
               <mc:Choice xmlns:v="urn:schemas-microsoft-com:vml" Requires="v">
-                <p:oleObj spid="_x0000_s4107" name="Diapositiva think-cell" r:id="rId4" imgW="270" imgH="270" progId="TCLayout.ActiveDocument.1">
+                <p:oleObj spid="_x0000_s4111" name="Diapositiva think-cell" r:id="rId4" imgW="270" imgH="270" progId="TCLayout.ActiveDocument.1">
                   <p:embed/>
                 </p:oleObj>
               </mc:Choice>
@@ -7631,7 +7631,7 @@
             <a:fld id="{B9C6BC69-A223-7D4A-AE22-15BEED04061C}" type="datetime1">
               <a:rPr lang="it-IT"/>
               <a:pPr/>
-              <a:t>01/10/2025</a:t>
+              <a:t>18/10/2025</a:t>
             </a:fld>
             <a:endParaRPr lang="it-IT"/>
           </a:p>
@@ -8093,7 +8093,7 @@
             <a:fld id="{B9C6BC69-A223-7D4A-AE22-15BEED04061C}" type="datetime1">
               <a:rPr lang="it-IT"/>
               <a:pPr/>
-              <a:t>01/10/2025</a:t>
+              <a:t>18/10/2025</a:t>
             </a:fld>
             <a:endParaRPr lang="it-IT"/>
           </a:p>
@@ -8471,7 +8471,7 @@
             <a:fld id="{B9C6BC69-A223-7D4A-AE22-15BEED04061C}" type="datetime1">
               <a:rPr lang="it-IT"/>
               <a:pPr/>
-              <a:t>01/10/2025</a:t>
+              <a:t>18/10/2025</a:t>
             </a:fld>
             <a:endParaRPr lang="it-IT"/>
           </a:p>
@@ -8790,7 +8790,7 @@
             <a:fld id="{B9C6BC69-A223-7D4A-AE22-15BEED04061C}" type="datetime1">
               <a:rPr lang="it-IT"/>
               <a:pPr/>
-              <a:t>01/10/2025</a:t>
+              <a:t>18/10/2025</a:t>
             </a:fld>
             <a:endParaRPr lang="it-IT"/>
           </a:p>
@@ -8862,7 +8862,7 @@
           <a:graphicData uri="http://schemas.openxmlformats.org/presentationml/2006/ole">
             <mc:AlternateContent xmlns:mc="http://schemas.openxmlformats.org/markup-compatibility/2006">
               <mc:Choice xmlns:v="urn:schemas-microsoft-com:vml" Requires="v">
-                <p:oleObj spid="_x0000_s1035" name="Diapositiva think-cell" r:id="rId5" imgW="270" imgH="270" progId="TCLayout.ActiveDocument.1">
+                <p:oleObj spid="_x0000_s1039" name="Diapositiva think-cell" r:id="rId5" imgW="270" imgH="270" progId="TCLayout.ActiveDocument.1">
                   <p:embed/>
                 </p:oleObj>
               </mc:Choice>
@@ -9299,7 +9299,7 @@
           <a:graphicData uri="http://schemas.openxmlformats.org/presentationml/2006/ole">
             <mc:AlternateContent xmlns:mc="http://schemas.openxmlformats.org/markup-compatibility/2006">
               <mc:Choice xmlns:v="urn:schemas-microsoft-com:vml" Requires="v">
-                <p:oleObj spid="_x0000_s12299" name="Diapositiva think-cell" r:id="rId6" imgW="270" imgH="270" progId="TCLayout.ActiveDocument.1">
+                <p:oleObj spid="_x0000_s12303" name="Diapositiva think-cell" r:id="rId6" imgW="270" imgH="270" progId="TCLayout.ActiveDocument.1">
                   <p:embed/>
                 </p:oleObj>
               </mc:Choice>
@@ -9887,7 +9887,7 @@
           <a:graphicData uri="http://schemas.openxmlformats.org/presentationml/2006/ole">
             <mc:AlternateContent xmlns:mc="http://schemas.openxmlformats.org/markup-compatibility/2006">
               <mc:Choice xmlns:v="urn:schemas-microsoft-com:vml" Requires="v">
-                <p:oleObj spid="_x0000_s2059" name="Diapositiva think-cell" r:id="rId7" imgW="270" imgH="270" progId="TCLayout.ActiveDocument.1">
+                <p:oleObj spid="_x0000_s2063" name="Diapositiva think-cell" r:id="rId7" imgW="270" imgH="270" progId="TCLayout.ActiveDocument.1">
                   <p:embed/>
                 </p:oleObj>
               </mc:Choice>
@@ -10299,7 +10299,7 @@
           <a:graphicData uri="http://schemas.openxmlformats.org/presentationml/2006/ole">
             <mc:AlternateContent xmlns:mc="http://schemas.openxmlformats.org/markup-compatibility/2006">
               <mc:Choice xmlns:v="urn:schemas-microsoft-com:vml" Requires="v">
-                <p:oleObj spid="_x0000_s3083" name="Diapositiva think-cell" r:id="rId16" imgW="270" imgH="270" progId="TCLayout.ActiveDocument.1">
+                <p:oleObj spid="_x0000_s3087" name="Diapositiva think-cell" r:id="rId16" imgW="270" imgH="270" progId="TCLayout.ActiveDocument.1">
                   <p:embed/>
                 </p:oleObj>
               </mc:Choice>
@@ -10809,7 +10809,7 @@
           <a:graphicData uri="http://schemas.openxmlformats.org/presentationml/2006/ole">
             <mc:AlternateContent xmlns:mc="http://schemas.openxmlformats.org/markup-compatibility/2006">
               <mc:Choice xmlns:v="urn:schemas-microsoft-com:vml" Requires="v">
-                <p:oleObj spid="_x0000_s6155" name="Diapositiva think-cell" r:id="rId6" imgW="270" imgH="270" progId="TCLayout.ActiveDocument.1">
+                <p:oleObj spid="_x0000_s6159" name="Diapositiva think-cell" r:id="rId6" imgW="270" imgH="270" progId="TCLayout.ActiveDocument.1">
                   <p:embed/>
                 </p:oleObj>
               </mc:Choice>
@@ -11584,7 +11584,7 @@
           <a:graphicData uri="http://schemas.openxmlformats.org/presentationml/2006/ole">
             <mc:AlternateContent xmlns:mc="http://schemas.openxmlformats.org/markup-compatibility/2006">
               <mc:Choice xmlns:v="urn:schemas-microsoft-com:vml" Requires="v">
-                <p:oleObj spid="_x0000_s7179" name="Diapositiva think-cell" r:id="rId6" imgW="270" imgH="270" progId="TCLayout.ActiveDocument.1">
+                <p:oleObj spid="_x0000_s7183" name="Diapositiva think-cell" r:id="rId6" imgW="270" imgH="270" progId="TCLayout.ActiveDocument.1">
                   <p:embed/>
                 </p:oleObj>
               </mc:Choice>
@@ -12455,7 +12455,7 @@
           <a:graphicData uri="http://schemas.openxmlformats.org/presentationml/2006/ole">
             <mc:AlternateContent xmlns:mc="http://schemas.openxmlformats.org/markup-compatibility/2006">
               <mc:Choice xmlns:v="urn:schemas-microsoft-com:vml" Requires="v">
-                <p:oleObj spid="_x0000_s8203" name="Diapositiva think-cell" r:id="rId6" imgW="270" imgH="270" progId="TCLayout.ActiveDocument.1">
+                <p:oleObj spid="_x0000_s8207" name="Diapositiva think-cell" r:id="rId6" imgW="270" imgH="270" progId="TCLayout.ActiveDocument.1">
                   <p:embed/>
                 </p:oleObj>
               </mc:Choice>
@@ -13274,7 +13274,7 @@
           <a:graphicData uri="http://schemas.openxmlformats.org/presentationml/2006/ole">
             <mc:AlternateContent xmlns:mc="http://schemas.openxmlformats.org/markup-compatibility/2006">
               <mc:Choice xmlns:v="urn:schemas-microsoft-com:vml" Requires="v">
-                <p:oleObj spid="_x0000_s9227" name="Diapositiva think-cell" r:id="rId5" imgW="216" imgH="216" progId="TCLayout.ActiveDocument.1">
+                <p:oleObj spid="_x0000_s9231" name="Diapositiva think-cell" r:id="rId5" imgW="216" imgH="216" progId="TCLayout.ActiveDocument.1">
                   <p:embed/>
                 </p:oleObj>
               </mc:Choice>
@@ -13922,7 +13922,7 @@
           <a:graphicData uri="http://schemas.openxmlformats.org/presentationml/2006/ole">
             <mc:AlternateContent xmlns:mc="http://schemas.openxmlformats.org/markup-compatibility/2006">
               <mc:Choice xmlns:v="urn:schemas-microsoft-com:vml" Requires="v">
-                <p:oleObj spid="_x0000_s10251" name="Diapositiva think-cell" r:id="rId6" imgW="270" imgH="270" progId="TCLayout.ActiveDocument.1">
+                <p:oleObj spid="_x0000_s10255" name="Diapositiva think-cell" r:id="rId6" imgW="270" imgH="270" progId="TCLayout.ActiveDocument.1">
                   <p:embed/>
                 </p:oleObj>
               </mc:Choice>
@@ -14713,7 +14713,7 @@
           <a:graphicData uri="http://schemas.openxmlformats.org/presentationml/2006/ole">
             <mc:AlternateContent xmlns:mc="http://schemas.openxmlformats.org/markup-compatibility/2006">
               <mc:Choice xmlns:v="urn:schemas-microsoft-com:vml" Requires="v">
-                <p:oleObj spid="_x0000_s11275" name="Diapositiva think-cell" r:id="rId5" imgW="216" imgH="216" progId="TCLayout.ActiveDocument.1">
+                <p:oleObj spid="_x0000_s11279" name="Diapositiva think-cell" r:id="rId5" imgW="216" imgH="216" progId="TCLayout.ActiveDocument.1">
                   <p:embed/>
                 </p:oleObj>
               </mc:Choice>
@@ -15341,7 +15341,7 @@
             <a:fld id="{8214DEE6-7743-F44A-92DF-ABEA6EBF579C}" type="datetime1">
               <a:rPr lang="it-IT" smtClean="0"/>
               <a:pPr/>
-              <a:t>01/10/2025</a:t>
+              <a:t>18/10/2025</a:t>
             </a:fld>
             <a:endParaRPr lang="it-IT"/>
           </a:p>
@@ -15408,113 +15408,89 @@
           <a:chExt cx="0" cy="0"/>
         </a:xfrm>
       </p:grpSpPr>
-      <p:graphicFrame>
-        <p:nvGraphicFramePr>
-          <p:cNvPr id="2" name="Oggetto 1" hidden="1"/>
-          <p:cNvGraphicFramePr>
-            <a:graphicFrameLocks noChangeAspect="1"/>
-          </p:cNvGraphicFramePr>
-          <p:nvPr>
-            <p:custDataLst>
-              <p:tags r:id="rId2"/>
-            </p:custDataLst>
-          </p:nvPr>
-        </p:nvGraphicFramePr>
-        <p:xfrm>
-          <a:off x="1588" y="1588"/>
-          <a:ext cx="1587" cy="1587"/>
-        </p:xfrm>
-        <a:graphic>
-          <a:graphicData uri="http://schemas.openxmlformats.org/presentationml/2006/ole">
-            <mc:AlternateContent xmlns:mc="http://schemas.openxmlformats.org/markup-compatibility/2006">
-              <mc:Choice xmlns:v="urn:schemas-microsoft-com:vml" Requires="v">
-                <p:oleObj spid="_x0000_s14347" name="Diapositiva think-cell" r:id="rId4" imgW="270" imgH="270" progId="TCLayout.ActiveDocument.1">
-                  <p:embed/>
-                </p:oleObj>
-              </mc:Choice>
-              <mc:Fallback>
-                <p:oleObj name="Diapositiva think-cell" r:id="rId4" imgW="270" imgH="270" progId="TCLayout.ActiveDocument.1">
-                  <p:embed/>
-                  <p:pic>
-                    <p:nvPicPr>
-                      <p:cNvPr id="2" name="Oggetto 1" hidden="1"/>
-                      <p:cNvPicPr/>
-                      <p:nvPr/>
-                    </p:nvPicPr>
-                    <p:blipFill>
-                      <a:blip r:embed="rId5"/>
-                      <a:stretch>
-                        <a:fillRect/>
-                      </a:stretch>
-                    </p:blipFill>
-                    <p:spPr>
-                      <a:xfrm>
-                        <a:off x="1588" y="1588"/>
-                        <a:ext cx="1587" cy="1587"/>
-                      </a:xfrm>
-                      <a:prstGeom prst="rect">
-                        <a:avLst/>
-                      </a:prstGeom>
-                    </p:spPr>
-                  </p:pic>
-                </p:oleObj>
-              </mc:Fallback>
-            </mc:AlternateContent>
-          </a:graphicData>
-        </a:graphic>
-      </p:graphicFrame>
-      <p:pic>
-        <p:nvPicPr>
-          <p:cNvPr id="6" name="Picture 5">
-            <a:extLst>
-              <a:ext uri="{FF2B5EF4-FFF2-40B4-BE49-F238E27FC236}">
-                <a16:creationId xmlns:a16="http://schemas.microsoft.com/office/drawing/2014/main" xmlns="" id="{53D91E67-CAFC-D7D6-F019-7AD3237D1098}"/>
-              </a:ext>
-            </a:extLst>
-          </p:cNvPr>
-          <p:cNvPicPr>
-            <a:picLocks noChangeAspect="1"/>
-          </p:cNvPicPr>
+      <p:sp>
+        <p:nvSpPr>
+          <p:cNvPr id="2" name="TextBox 1"/>
+          <p:cNvSpPr txBox="1"/>
           <p:nvPr/>
-        </p:nvPicPr>
-        <p:blipFill>
-          <a:blip r:embed="rId6"/>
-          <a:stretch>
-            <a:fillRect/>
-          </a:stretch>
-        </p:blipFill>
+        </p:nvSpPr>
         <p:spPr>
           <a:xfrm>
-            <a:off x="0" y="2133"/>
-            <a:ext cx="10688638" cy="6012359"/>
+            <a:off x="408214" y="462643"/>
+            <a:ext cx="9797143" cy="769441"/>
           </a:xfrm>
           <a:prstGeom prst="rect">
             <a:avLst/>
           </a:prstGeom>
+          <a:noFill/>
         </p:spPr>
-      </p:pic>
+        <p:txBody>
+          <a:bodyPr wrap="square" rtlCol="0">
+            <a:spAutoFit/>
+          </a:bodyPr>
+          <a:lstStyle/>
+          <a:p>
+            <a:r>
+              <a:rPr lang="it-IT" sz="2200" b="1" dirty="0" smtClean="0">
+                <a:solidFill>
+                  <a:srgbClr val="FF0000"/>
+                </a:solidFill>
+              </a:rPr>
+              <a:t>INDEX</a:t>
+            </a:r>
+          </a:p>
+          <a:p>
+            <a:endParaRPr lang="en-GB" sz="2200" b="1" dirty="0">
+              <a:solidFill>
+                <a:schemeClr val="bg1"/>
+              </a:solidFill>
+            </a:endParaRPr>
+          </a:p>
+        </p:txBody>
+      </p:sp>
+      <p:sp>
+        <p:nvSpPr>
+          <p:cNvPr id="3" name="TextBox 2"/>
+          <p:cNvSpPr txBox="1"/>
+          <p:nvPr/>
+        </p:nvSpPr>
+        <p:spPr>
+          <a:xfrm>
+            <a:off x="473529" y="1099456"/>
+            <a:ext cx="9780814" cy="369332"/>
+          </a:xfrm>
+          <a:prstGeom prst="rect">
+            <a:avLst/>
+          </a:prstGeom>
+          <a:noFill/>
+        </p:spPr>
+        <p:txBody>
+          <a:bodyPr wrap="square" rtlCol="0">
+            <a:spAutoFit/>
+          </a:bodyPr>
+          <a:lstStyle/>
+          <a:p>
+            <a:pPr marL="285750" indent="-285750">
+              <a:buFont typeface="Arial" panose="020B0604020202020204" pitchFamily="34" charset="0"/>
+              <a:buChar char="•"/>
+            </a:pPr>
+            <a:r>
+              <a:rPr lang="it-IT" dirty="0" smtClean="0"/>
+              <a:t>...</a:t>
+            </a:r>
+          </a:p>
+        </p:txBody>
+      </p:sp>
     </p:spTree>
     <p:extLst>
       <p:ext uri="{BB962C8B-B14F-4D97-AF65-F5344CB8AC3E}">
-        <p14:creationId xmlns:p14="http://schemas.microsoft.com/office/powerpoint/2010/main" val="3120991205"/>
+        <p14:creationId xmlns:p14="http://schemas.microsoft.com/office/powerpoint/2010/main" val="717912540"/>
       </p:ext>
     </p:extLst>
   </p:cSld>
   <p:clrMapOvr>
     <a:masterClrMapping/>
   </p:clrMapOvr>
-  <mc:AlternateContent xmlns:mc="http://schemas.openxmlformats.org/markup-compatibility/2006">
-    <mc:Choice xmlns:p159="http://schemas.microsoft.com/office/powerpoint/2015/09/main" xmlns="" Requires="p159">
-      <p:transition>
-        <p159:morph option="byObject"/>
-      </p:transition>
-    </mc:Choice>
-    <mc:Fallback>
-      <p:transition>
-        <p:fade/>
-      </p:transition>
-    </mc:Fallback>
-  </mc:AlternateContent>
 </p:sld>
 </file>
 
@@ -15587,6 +15563,13 @@
           <a:prstGeom prst="rect">
             <a:avLst/>
           </a:prstGeom>
+          <a:ln>
+            <a:solidFill>
+              <a:schemeClr val="tx1">
+                <a:lumMod val="50000"/>
+              </a:schemeClr>
+            </a:solidFill>
+          </a:ln>
         </p:spPr>
         <p:style>
           <a:lnRef idx="1">
@@ -15607,7 +15590,11 @@
           <a:lstStyle/>
           <a:p>
             <a:pPr algn="ctr"/>
-            <a:endParaRPr lang="en-GB"/>
+            <a:endParaRPr lang="en-GB">
+              <a:solidFill>
+                <a:srgbClr val="FFFFFF"/>
+              </a:solidFill>
+            </a:endParaRPr>
           </a:p>
         </p:txBody>
       </p:sp>
@@ -15699,12 +15686,6 @@
 <file path=ppt/tags/tag20.xml><?xml version="1.0" encoding="utf-8"?>
 <p:tagLst xmlns:a="http://schemas.openxmlformats.org/drawingml/2006/main" xmlns:r="http://schemas.openxmlformats.org/officeDocument/2006/relationships" xmlns:p="http://schemas.openxmlformats.org/presentationml/2006/main">
   <p:tag name="THINKCELLSHAPEDONOTDELETE" val="tNaVv4PLg.OuiRF8kPdoP2w"/>
-</p:tagLst>
-</file>
-
-<file path=ppt/tags/tag21.xml><?xml version="1.0" encoding="utf-8"?>
-<p:tagLst xmlns:a="http://schemas.openxmlformats.org/drawingml/2006/main" xmlns:r="http://schemas.openxmlformats.org/officeDocument/2006/relationships" xmlns:p="http://schemas.openxmlformats.org/presentationml/2006/main">
-  <p:tag name="THINKCELLSHAPEDONOTDELETE" val="thinkcellActiveDocDoNotDelete"/>
 </p:tagLst>
 </file>
 

</xml_diff>